<commit_message>
Update IO Models and theoretical background.pptx
remove slide
</commit_message>
<xml_diff>
--- a/Module 1/1.1 Input-Output Models and Theoretical Background/IO Models and theoretical background.pptx
+++ b/Module 1/1.1 Input-Output Models and Theoretical Background/IO Models and theoretical background.pptx
@@ -6,10 +6,10 @@
     <p:sldMasterId id="2147483660" r:id="rId2"/>
   </p:sldMasterIdLst>
   <p:notesMasterIdLst>
-    <p:notesMasterId r:id="rId12"/>
+    <p:notesMasterId r:id="rId11"/>
   </p:notesMasterIdLst>
   <p:handoutMasterIdLst>
-    <p:handoutMasterId r:id="rId13"/>
+    <p:handoutMasterId r:id="rId12"/>
   </p:handoutMasterIdLst>
   <p:sldIdLst>
     <p:sldId id="307" r:id="rId3"/>
@@ -19,8 +19,7 @@
     <p:sldId id="687" r:id="rId7"/>
     <p:sldId id="688" r:id="rId8"/>
     <p:sldId id="689" r:id="rId9"/>
-    <p:sldId id="690" r:id="rId10"/>
-    <p:sldId id="682" r:id="rId11"/>
+    <p:sldId id="682" r:id="rId10"/>
   </p:sldIdLst>
   <p:sldSz cx="12192000" cy="6858000"/>
   <p:notesSz cx="6858000" cy="9144000"/>
@@ -180,42 +179,6 @@
 </p:cmAuthorLst>
 </file>
 
-<file path=ppt/comments/comment1.xml><?xml version="1.0" encoding="utf-8"?>
-<p:cmLst xmlns:a="http://schemas.openxmlformats.org/drawingml/2006/main" xmlns:r="http://schemas.openxmlformats.org/officeDocument/2006/relationships" xmlns:p="http://schemas.openxmlformats.org/presentationml/2006/main">
-  <p:cm authorId="2" dt="2025-04-22T14:30:32.907" idx="2">
-    <p:pos x="4954" y="562"/>
-    <p:text>I don't think this slide should be here... It's too eary to talk about this...</p:text>
-    <p:extLst>
-      <p:ext uri="{C676402C-5697-4E1C-873F-D02D1690AC5C}">
-        <p15:threadingInfo xmlns:p15="http://schemas.microsoft.com/office/powerpoint/2012/main" timeZoneBias="-120"/>
-      </p:ext>
-    </p:extLst>
-  </p:cm>
-  <p:cm authorId="3" dt="2025-04-23T11:42:32.082" idx="1">
-    <p:pos x="4954" y="698"/>
-    <p:text>Okay, I am hiding this slide for now so we can maybe use it later.</p:text>
-    <p:extLst>
-      <p:ext uri="{C676402C-5697-4E1C-873F-D02D1690AC5C}">
-        <p15:threadingInfo xmlns:p15="http://schemas.microsoft.com/office/powerpoint/2012/main" timeZoneBias="-120">
-          <p15:parentCm authorId="2" idx="2"/>
-        </p15:threadingInfo>
-      </p:ext>
-    </p:extLst>
-  </p:cm>
-  <p:cm authorId="3" dt="2025-04-23T11:44:01.348" idx="2">
-    <p:pos x="4954" y="834"/>
-    <p:text>But I believe this should be discussed somewhere quite early in the training kit. I guess from our experiences in the NGFS, people tend to think that IO can easily do and calculate everything as CGE models...</p:text>
-    <p:extLst>
-      <p:ext uri="{C676402C-5697-4E1C-873F-D02D1690AC5C}">
-        <p15:threadingInfo xmlns:p15="http://schemas.microsoft.com/office/powerpoint/2012/main" timeZoneBias="-120">
-          <p15:parentCm authorId="2" idx="2"/>
-        </p15:threadingInfo>
-      </p:ext>
-    </p:extLst>
-  </p:cm>
-</p:cmLst>
-</file>
-
 <file path=ppt/handoutMasters/handoutMaster1.xml><?xml version="1.0" encoding="utf-8"?>
 <p:handoutMaster xmlns:a="http://schemas.openxmlformats.org/drawingml/2006/main" xmlns:r="http://schemas.openxmlformats.org/officeDocument/2006/relationships" xmlns:p="http://schemas.openxmlformats.org/presentationml/2006/main">
   <p:cSld>
@@ -298,7 +261,7 @@
           <a:p>
             <a:fld id="{6820DB99-3CFE-A049-BD9E-7FB31C116483}" type="datetime1">
               <a:rPr lang="en-US" smtClean="0"/>
-              <a:t>4/23/25</a:t>
+              <a:t>4/24/2025</a:t>
             </a:fld>
             <a:endParaRPr lang="en-US"/>
           </a:p>
@@ -364,7 +327,7 @@
           <a:p>
             <a:fld id="{DBE0BB57-DC73-764C-A58B-61339E1E8DD3}" type="slidenum">
               <a:rPr lang="en-US" smtClean="0"/>
-              <a:t>‹nº›</a:t>
+              <a:t>‹N°›</a:t>
             </a:fld>
             <a:endParaRPr lang="en-US"/>
           </a:p>
@@ -464,7 +427,7 @@
           <a:p>
             <a:fld id="{1DA03147-2684-674F-8929-FD8FCA0CDEFF}" type="datetime1">
               <a:rPr lang="en-US" smtClean="0"/>
-              <a:t>4/23/25</a:t>
+              <a:t>4/24/2025</a:t>
             </a:fld>
             <a:endParaRPr lang="en-US"/>
           </a:p>
@@ -622,7 +585,7 @@
           <a:p>
             <a:fld id="{61E385B3-6F63-4903-BDA2-5A5BFDA7B338}" type="slidenum">
               <a:rPr lang="en-US" smtClean="0"/>
-              <a:t>‹nº›</a:t>
+              <a:t>‹N°›</a:t>
             </a:fld>
             <a:endParaRPr lang="en-US"/>
           </a:p>
@@ -1140,114 +1103,6 @@
 </p:notes>
 </file>
 
-<file path=ppt/notesSlides/notesSlide5.xml><?xml version="1.0" encoding="utf-8"?>
-<p:notes xmlns:a="http://schemas.openxmlformats.org/drawingml/2006/main" xmlns:r="http://schemas.openxmlformats.org/officeDocument/2006/relationships" xmlns:p="http://schemas.openxmlformats.org/presentationml/2006/main">
-  <p:cSld>
-    <p:spTree>
-      <p:nvGrpSpPr>
-        <p:cNvPr id="1" name="">
-          <a:extLst>
-            <a:ext uri="{FF2B5EF4-FFF2-40B4-BE49-F238E27FC236}">
-              <a16:creationId xmlns:a16="http://schemas.microsoft.com/office/drawing/2014/main" id="{65EE836D-6988-2505-F897-E54FFAE0A59E}"/>
-            </a:ext>
-          </a:extLst>
-        </p:cNvPr>
-        <p:cNvGrpSpPr/>
-        <p:nvPr/>
-      </p:nvGrpSpPr>
-      <p:grpSpPr>
-        <a:xfrm>
-          <a:off x="0" y="0"/>
-          <a:ext cx="0" cy="0"/>
-          <a:chOff x="0" y="0"/>
-          <a:chExt cx="0" cy="0"/>
-        </a:xfrm>
-      </p:grpSpPr>
-      <p:sp>
-        <p:nvSpPr>
-          <p:cNvPr id="2" name="Espaço Reservado para Imagem de Slide 1">
-            <a:extLst>
-              <a:ext uri="{FF2B5EF4-FFF2-40B4-BE49-F238E27FC236}">
-                <a16:creationId xmlns:a16="http://schemas.microsoft.com/office/drawing/2014/main" id="{9E27F1E8-68DF-3EE6-F210-3526C707CA0A}"/>
-              </a:ext>
-            </a:extLst>
-          </p:cNvPr>
-          <p:cNvSpPr>
-            <a:spLocks noGrp="1" noRot="1" noChangeAspect="1"/>
-          </p:cNvSpPr>
-          <p:nvPr>
-            <p:ph type="sldImg"/>
-          </p:nvPr>
-        </p:nvSpPr>
-        <p:spPr/>
-      </p:sp>
-      <p:sp>
-        <p:nvSpPr>
-          <p:cNvPr id="3" name="Espaço Reservado para Anotações 2">
-            <a:extLst>
-              <a:ext uri="{FF2B5EF4-FFF2-40B4-BE49-F238E27FC236}">
-                <a16:creationId xmlns:a16="http://schemas.microsoft.com/office/drawing/2014/main" id="{BFA4B96D-6DDF-B1A1-C031-6E1D69259C8E}"/>
-              </a:ext>
-            </a:extLst>
-          </p:cNvPr>
-          <p:cNvSpPr>
-            <a:spLocks noGrp="1"/>
-          </p:cNvSpPr>
-          <p:nvPr>
-            <p:ph type="body" idx="1"/>
-          </p:nvPr>
-        </p:nvSpPr>
-        <p:spPr/>
-        <p:txBody>
-          <a:bodyPr/>
-          <a:lstStyle/>
-          <a:p>
-            <a:endParaRPr lang="pt-BR" dirty="0"/>
-          </a:p>
-        </p:txBody>
-      </p:sp>
-      <p:sp>
-        <p:nvSpPr>
-          <p:cNvPr id="4" name="Espaço Reservado para Número de Slide 3">
-            <a:extLst>
-              <a:ext uri="{FF2B5EF4-FFF2-40B4-BE49-F238E27FC236}">
-                <a16:creationId xmlns:a16="http://schemas.microsoft.com/office/drawing/2014/main" id="{CBD07B48-CE77-8470-0862-D33A486837A4}"/>
-              </a:ext>
-            </a:extLst>
-          </p:cNvPr>
-          <p:cNvSpPr>
-            <a:spLocks noGrp="1"/>
-          </p:cNvSpPr>
-          <p:nvPr>
-            <p:ph type="sldNum" sz="quarter" idx="5"/>
-          </p:nvPr>
-        </p:nvSpPr>
-        <p:spPr/>
-        <p:txBody>
-          <a:bodyPr/>
-          <a:lstStyle/>
-          <a:p>
-            <a:fld id="{61E385B3-6F63-4903-BDA2-5A5BFDA7B338}" type="slidenum">
-              <a:rPr lang="en-US" smtClean="0"/>
-              <a:t>8</a:t>
-            </a:fld>
-            <a:endParaRPr lang="en-US"/>
-          </a:p>
-        </p:txBody>
-      </p:sp>
-    </p:spTree>
-    <p:extLst>
-      <p:ext uri="{BB962C8B-B14F-4D97-AF65-F5344CB8AC3E}">
-        <p14:creationId xmlns:p14="http://schemas.microsoft.com/office/powerpoint/2010/main" val="1815219720"/>
-      </p:ext>
-    </p:extLst>
-  </p:cSld>
-  <p:clrMapOvr>
-    <a:masterClrMapping/>
-  </p:clrMapOvr>
-</p:notes>
-</file>
-
 <file path=ppt/slideLayouts/slideLayout1.xml><?xml version="1.0" encoding="utf-8"?>
 <p:sldLayout xmlns:a="http://schemas.openxmlformats.org/drawingml/2006/main" xmlns:r="http://schemas.openxmlformats.org/officeDocument/2006/relationships" xmlns:p="http://schemas.openxmlformats.org/presentationml/2006/main" preserve="1" userDrawn="1">
   <p:cSld name="Title Slide">
@@ -3910,7 +3765,7 @@
             <a:fld id="{00000000-1234-1234-1234-123412341234}" type="slidenum">
               <a:rPr lang="en" smtClean="0"/>
               <a:pPr algn="ctr"/>
-              <a:t>‹nº›</a:t>
+              <a:t>‹N°›</a:t>
             </a:fld>
             <a:r>
               <a:rPr lang="en"/>
@@ -4538,7 +4393,7 @@
                 </a:solidFill>
               </a:rPr>
               <a:pPr/>
-              <a:t>‹nº›</a:t>
+              <a:t>‹N°›</a:t>
             </a:fld>
             <a:endParaRPr lang="fr-FR" sz="1200" dirty="0">
               <a:solidFill>
@@ -4945,6 +4800,10 @@
             <a:br>
               <a:rPr lang="en-US" sz="4000" noProof="0" dirty="0"/>
             </a:br>
+            <a:r>
+              <a:rPr lang="en-US" sz="4000" noProof="0" dirty="0"/>
+              <a:t/>
+            </a:r>
             <a:br>
               <a:rPr lang="en-US" sz="4000" noProof="0" dirty="0"/>
             </a:br>
@@ -6322,241 +6181,6 @@
 </file>
 
 <file path=ppt/slides/slide8.xml><?xml version="1.0" encoding="utf-8"?>
-<p:sld xmlns:a="http://schemas.openxmlformats.org/drawingml/2006/main" xmlns:r="http://schemas.openxmlformats.org/officeDocument/2006/relationships" xmlns:p="http://schemas.openxmlformats.org/presentationml/2006/main" show="0">
-  <p:cSld>
-    <p:spTree>
-      <p:nvGrpSpPr>
-        <p:cNvPr id="1" name="">
-          <a:extLst>
-            <a:ext uri="{FF2B5EF4-FFF2-40B4-BE49-F238E27FC236}">
-              <a16:creationId xmlns:a16="http://schemas.microsoft.com/office/drawing/2014/main" id="{3CC0C7AA-E9DC-8B66-8A5D-31B2EB4AEC6A}"/>
-            </a:ext>
-          </a:extLst>
-        </p:cNvPr>
-        <p:cNvGrpSpPr/>
-        <p:nvPr/>
-      </p:nvGrpSpPr>
-      <p:grpSpPr>
-        <a:xfrm>
-          <a:off x="0" y="0"/>
-          <a:ext cx="0" cy="0"/>
-          <a:chOff x="0" y="0"/>
-          <a:chExt cx="0" cy="0"/>
-        </a:xfrm>
-      </p:grpSpPr>
-      <p:sp>
-        <p:nvSpPr>
-          <p:cNvPr id="2" name="Titre 1">
-            <a:extLst>
-              <a:ext uri="{FF2B5EF4-FFF2-40B4-BE49-F238E27FC236}">
-                <a16:creationId xmlns:a16="http://schemas.microsoft.com/office/drawing/2014/main" id="{25FF8EEC-235E-AD1C-99B3-1F99D1784D96}"/>
-              </a:ext>
-            </a:extLst>
-          </p:cNvPr>
-          <p:cNvSpPr>
-            <a:spLocks noGrp="1"/>
-          </p:cNvSpPr>
-          <p:nvPr>
-            <p:ph type="title"/>
-          </p:nvPr>
-        </p:nvSpPr>
-        <p:spPr/>
-        <p:txBody>
-          <a:bodyPr/>
-          <a:lstStyle/>
-          <a:p>
-            <a:r>
-              <a:rPr lang="en-US" noProof="0" dirty="0"/>
-              <a:t>The Basics of Input-Output Analysis</a:t>
-            </a:r>
-          </a:p>
-        </p:txBody>
-      </p:sp>
-      <p:sp>
-        <p:nvSpPr>
-          <p:cNvPr id="3" name="Espace réservé du contenu 2">
-            <a:extLst>
-              <a:ext uri="{FF2B5EF4-FFF2-40B4-BE49-F238E27FC236}">
-                <a16:creationId xmlns:a16="http://schemas.microsoft.com/office/drawing/2014/main" id="{E933966B-0B33-80A4-24A7-55984DF243ED}"/>
-              </a:ext>
-            </a:extLst>
-          </p:cNvPr>
-          <p:cNvSpPr>
-            <a:spLocks noGrp="1"/>
-          </p:cNvSpPr>
-          <p:nvPr>
-            <p:ph idx="1"/>
-          </p:nvPr>
-        </p:nvSpPr>
-        <p:spPr>
-          <a:xfrm>
-            <a:off x="695401" y="1484784"/>
-            <a:ext cx="10513167" cy="4709195"/>
-          </a:xfrm>
-        </p:spPr>
-        <p:txBody>
-          <a:bodyPr/>
-          <a:lstStyle/>
-          <a:p>
-            <a:r>
-              <a:rPr lang="en-US" dirty="0"/>
-              <a:t>What Input-Output Models (IO Models) are not or cannot do? </a:t>
-            </a:r>
-          </a:p>
-          <a:p>
-            <a:pPr lvl="1"/>
-            <a:r>
-              <a:rPr lang="en-US" dirty="0"/>
-              <a:t>Standard IO Models are not economic growth models per se, although they could be adapted into growth models</a:t>
-            </a:r>
-          </a:p>
-          <a:p>
-            <a:pPr lvl="1"/>
-            <a:r>
-              <a:rPr lang="en-US" dirty="0"/>
-              <a:t>Standard IO Models are not dynamic, although they could be transformed to be. They are a static picture of the economy in a given accounting period </a:t>
-            </a:r>
-          </a:p>
-          <a:p>
-            <a:pPr lvl="1"/>
-            <a:r>
-              <a:rPr lang="en-US" dirty="0"/>
-              <a:t>Standard IO Models establish linear relationships between the sectors which leads to the modeling assumption of constant returns to scale </a:t>
-            </a:r>
-          </a:p>
-          <a:p>
-            <a:pPr lvl="1"/>
-            <a:r>
-              <a:rPr lang="en-US" dirty="0"/>
-              <a:t>Standard IO Models per se do not contain financial information, although they could be adapted to contain it </a:t>
-            </a:r>
-          </a:p>
-          <a:p>
-            <a:pPr marL="0" indent="0">
-              <a:buNone/>
-            </a:pPr>
-            <a:endParaRPr lang="en-US" dirty="0"/>
-          </a:p>
-          <a:p>
-            <a:r>
-              <a:rPr lang="en-US" dirty="0"/>
-              <a:t>What IO Models are or can do? </a:t>
-            </a:r>
-          </a:p>
-          <a:p>
-            <a:pPr lvl="1"/>
-            <a:r>
-              <a:rPr lang="en-US" dirty="0"/>
-              <a:t>Standard IO Tables can be complemented with extensions containing additional details of the economic activity, which can also be modeled within IO Models</a:t>
-            </a:r>
-          </a:p>
-          <a:p>
-            <a:pPr lvl="2"/>
-            <a:r>
-              <a:rPr lang="en-US" dirty="0"/>
-              <a:t>e.g. environmental/employment/capital use information at industrial level could be attached to IO Models </a:t>
-            </a:r>
-          </a:p>
-          <a:p>
-            <a:pPr lvl="1"/>
-            <a:r>
-              <a:rPr lang="en-US" dirty="0"/>
-              <a:t>IO Models can be combined with other forms of economic modeling </a:t>
-            </a:r>
-          </a:p>
-          <a:p>
-            <a:pPr lvl="2"/>
-            <a:r>
-              <a:rPr lang="en-US" dirty="0"/>
-              <a:t>e.g. they can be made Stock and Flow Consistent (SFC) or adapted together with Computable General Equilibrium Models (CGE Models)</a:t>
-            </a:r>
-          </a:p>
-          <a:p>
-            <a:pPr lvl="1"/>
-            <a:r>
-              <a:rPr lang="en-US" dirty="0"/>
-              <a:t>Although Standard IO Models do not simulate future technological change, they are a great tool to assess past technological changes affecting the productive structure</a:t>
-            </a:r>
-          </a:p>
-          <a:p>
-            <a:endParaRPr lang="en-US" dirty="0"/>
-          </a:p>
-          <a:p>
-            <a:endParaRPr lang="en-US" u="sng" dirty="0"/>
-          </a:p>
-          <a:p>
-            <a:pPr lvl="1"/>
-            <a:endParaRPr lang="en-US" dirty="0"/>
-          </a:p>
-        </p:txBody>
-      </p:sp>
-      <p:sp>
-        <p:nvSpPr>
-          <p:cNvPr id="4" name="Espace réservé du texte 3">
-            <a:extLst>
-              <a:ext uri="{FF2B5EF4-FFF2-40B4-BE49-F238E27FC236}">
-                <a16:creationId xmlns:a16="http://schemas.microsoft.com/office/drawing/2014/main" id="{1EA00FCA-3886-DEA6-A077-B491FE8F158C}"/>
-              </a:ext>
-            </a:extLst>
-          </p:cNvPr>
-          <p:cNvSpPr>
-            <a:spLocks noGrp="1"/>
-          </p:cNvSpPr>
-          <p:nvPr>
-            <p:ph type="body" sz="quarter" idx="13"/>
-          </p:nvPr>
-        </p:nvSpPr>
-        <p:spPr/>
-        <p:txBody>
-          <a:bodyPr/>
-          <a:lstStyle/>
-          <a:p>
-            <a:r>
-              <a:rPr lang="en-US" noProof="0" dirty="0"/>
-              <a:t>Interindustry analysis and fundamental intuitions</a:t>
-            </a:r>
-          </a:p>
-        </p:txBody>
-      </p:sp>
-      <p:sp>
-        <p:nvSpPr>
-          <p:cNvPr id="5" name="Espace réservé du texte 4">
-            <a:extLst>
-              <a:ext uri="{FF2B5EF4-FFF2-40B4-BE49-F238E27FC236}">
-                <a16:creationId xmlns:a16="http://schemas.microsoft.com/office/drawing/2014/main" id="{69A34EAC-863C-AFE7-86C5-FB229C213073}"/>
-              </a:ext>
-            </a:extLst>
-          </p:cNvPr>
-          <p:cNvSpPr>
-            <a:spLocks noGrp="1"/>
-          </p:cNvSpPr>
-          <p:nvPr>
-            <p:ph type="body" sz="quarter" idx="14"/>
-          </p:nvPr>
-        </p:nvSpPr>
-        <p:spPr/>
-        <p:txBody>
-          <a:bodyPr/>
-          <a:lstStyle/>
-          <a:p>
-            <a:endParaRPr lang="en-US" noProof="0" dirty="0"/>
-          </a:p>
-        </p:txBody>
-      </p:sp>
-    </p:spTree>
-    <p:extLst>
-      <p:ext uri="{BB962C8B-B14F-4D97-AF65-F5344CB8AC3E}">
-        <p14:creationId xmlns:p14="http://schemas.microsoft.com/office/powerpoint/2010/main" val="3939177047"/>
-      </p:ext>
-    </p:extLst>
-  </p:cSld>
-  <p:clrMapOvr>
-    <a:masterClrMapping/>
-  </p:clrMapOvr>
-</p:sld>
-</file>
-
-<file path=ppt/slides/slide9.xml><?xml version="1.0" encoding="utf-8"?>
 <p:sld xmlns:a="http://schemas.openxmlformats.org/drawingml/2006/main" xmlns:r="http://schemas.openxmlformats.org/officeDocument/2006/relationships" xmlns:p="http://schemas.openxmlformats.org/presentationml/2006/main">
   <p:cSld>
     <p:spTree>

</xml_diff>